<commit_message>
Final update of files before publication
</commit_message>
<xml_diff>
--- a/figures/Flanker DDM Figure.pptx
+++ b/figures/Flanker DDM Figure.pptx
@@ -7,6 +7,9 @@
   <p:sldIdLst>
     <p:sldId id="257" r:id="rId2"/>
     <p:sldId id="258" r:id="rId3"/>
+    <p:sldId id="259" r:id="rId4"/>
+    <p:sldId id="260" r:id="rId5"/>
+    <p:sldId id="261" r:id="rId6"/>
   </p:sldIdLst>
   <p:sldSz cx="12192000" cy="6858000"/>
   <p:notesSz cx="6858000" cy="9144000"/>
@@ -260,7 +263,7 @@
           <a:p>
             <a:fld id="{CB62FA6E-14E1-4D90-B6B3-E29F7F62F546}" type="datetimeFigureOut">
               <a:rPr lang="en-US" smtClean="0"/>
-              <a:t>11/20/23</a:t>
+              <a:t>4/11/24</a:t>
             </a:fld>
             <a:endParaRPr lang="en-US"/>
           </a:p>
@@ -458,7 +461,7 @@
           <a:p>
             <a:fld id="{CB62FA6E-14E1-4D90-B6B3-E29F7F62F546}" type="datetimeFigureOut">
               <a:rPr lang="en-US" smtClean="0"/>
-              <a:t>11/20/23</a:t>
+              <a:t>4/11/24</a:t>
             </a:fld>
             <a:endParaRPr lang="en-US"/>
           </a:p>
@@ -666,7 +669,7 @@
           <a:p>
             <a:fld id="{CB62FA6E-14E1-4D90-B6B3-E29F7F62F546}" type="datetimeFigureOut">
               <a:rPr lang="en-US" smtClean="0"/>
-              <a:t>11/20/23</a:t>
+              <a:t>4/11/24</a:t>
             </a:fld>
             <a:endParaRPr lang="en-US"/>
           </a:p>
@@ -864,7 +867,7 @@
           <a:p>
             <a:fld id="{CB62FA6E-14E1-4D90-B6B3-E29F7F62F546}" type="datetimeFigureOut">
               <a:rPr lang="en-US" smtClean="0"/>
-              <a:t>11/20/23</a:t>
+              <a:t>4/11/24</a:t>
             </a:fld>
             <a:endParaRPr lang="en-US"/>
           </a:p>
@@ -1139,7 +1142,7 @@
           <a:p>
             <a:fld id="{CB62FA6E-14E1-4D90-B6B3-E29F7F62F546}" type="datetimeFigureOut">
               <a:rPr lang="en-US" smtClean="0"/>
-              <a:t>11/20/23</a:t>
+              <a:t>4/11/24</a:t>
             </a:fld>
             <a:endParaRPr lang="en-US"/>
           </a:p>
@@ -1404,7 +1407,7 @@
           <a:p>
             <a:fld id="{CB62FA6E-14E1-4D90-B6B3-E29F7F62F546}" type="datetimeFigureOut">
               <a:rPr lang="en-US" smtClean="0"/>
-              <a:t>11/20/23</a:t>
+              <a:t>4/11/24</a:t>
             </a:fld>
             <a:endParaRPr lang="en-US"/>
           </a:p>
@@ -1816,7 +1819,7 @@
           <a:p>
             <a:fld id="{CB62FA6E-14E1-4D90-B6B3-E29F7F62F546}" type="datetimeFigureOut">
               <a:rPr lang="en-US" smtClean="0"/>
-              <a:t>11/20/23</a:t>
+              <a:t>4/11/24</a:t>
             </a:fld>
             <a:endParaRPr lang="en-US"/>
           </a:p>
@@ -1957,7 +1960,7 @@
           <a:p>
             <a:fld id="{CB62FA6E-14E1-4D90-B6B3-E29F7F62F546}" type="datetimeFigureOut">
               <a:rPr lang="en-US" smtClean="0"/>
-              <a:t>11/20/23</a:t>
+              <a:t>4/11/24</a:t>
             </a:fld>
             <a:endParaRPr lang="en-US"/>
           </a:p>
@@ -2070,7 +2073,7 @@
           <a:p>
             <a:fld id="{CB62FA6E-14E1-4D90-B6B3-E29F7F62F546}" type="datetimeFigureOut">
               <a:rPr lang="en-US" smtClean="0"/>
-              <a:t>11/20/23</a:t>
+              <a:t>4/11/24</a:t>
             </a:fld>
             <a:endParaRPr lang="en-US"/>
           </a:p>
@@ -2381,7 +2384,7 @@
           <a:p>
             <a:fld id="{CB62FA6E-14E1-4D90-B6B3-E29F7F62F546}" type="datetimeFigureOut">
               <a:rPr lang="en-US" smtClean="0"/>
-              <a:t>11/20/23</a:t>
+              <a:t>4/11/24</a:t>
             </a:fld>
             <a:endParaRPr lang="en-US"/>
           </a:p>
@@ -2669,7 +2672,7 @@
           <a:p>
             <a:fld id="{CB62FA6E-14E1-4D90-B6B3-E29F7F62F546}" type="datetimeFigureOut">
               <a:rPr lang="en-US" smtClean="0"/>
-              <a:t>11/20/23</a:t>
+              <a:t>4/11/24</a:t>
             </a:fld>
             <a:endParaRPr lang="en-US"/>
           </a:p>
@@ -2910,7 +2913,7 @@
           <a:p>
             <a:fld id="{CB62FA6E-14E1-4D90-B6B3-E29F7F62F546}" type="datetimeFigureOut">
               <a:rPr lang="en-US" smtClean="0"/>
-              <a:t>11/20/23</a:t>
+              <a:t>4/11/24</a:t>
             </a:fld>
             <a:endParaRPr lang="en-US"/>
           </a:p>
@@ -4617,6 +4620,1369 @@
 </p:sld>
 </file>
 
+<file path=ppt/slides/slide3.xml><?xml version="1.0" encoding="utf-8"?>
+<p:sld xmlns:a="http://schemas.openxmlformats.org/drawingml/2006/main" xmlns:r="http://schemas.openxmlformats.org/officeDocument/2006/relationships" xmlns:p="http://schemas.openxmlformats.org/presentationml/2006/main">
+  <p:cSld>
+    <p:spTree>
+      <p:nvGrpSpPr>
+        <p:cNvPr id="1" name=""/>
+        <p:cNvGrpSpPr/>
+        <p:nvPr/>
+      </p:nvGrpSpPr>
+      <p:grpSpPr>
+        <a:xfrm>
+          <a:off x="0" y="0"/>
+          <a:ext cx="0" cy="0"/>
+          <a:chOff x="0" y="0"/>
+          <a:chExt cx="0" cy="0"/>
+        </a:xfrm>
+      </p:grpSpPr>
+      <p:grpSp>
+        <p:nvGrpSpPr>
+          <p:cNvPr id="23" name="Group 22">
+            <a:extLst>
+              <a:ext uri="{FF2B5EF4-FFF2-40B4-BE49-F238E27FC236}">
+                <a16:creationId xmlns:a16="http://schemas.microsoft.com/office/drawing/2014/main" id="{EA8DE0C1-12C4-D46F-CA3D-11739229609E}"/>
+              </a:ext>
+            </a:extLst>
+          </p:cNvPr>
+          <p:cNvGrpSpPr/>
+          <p:nvPr/>
+        </p:nvGrpSpPr>
+        <p:grpSpPr>
+          <a:xfrm>
+            <a:off x="1252328" y="-40111"/>
+            <a:ext cx="9295816" cy="7185979"/>
+            <a:chOff x="1252328" y="-40111"/>
+            <a:chExt cx="9295816" cy="7185979"/>
+          </a:xfrm>
+        </p:grpSpPr>
+        <p:grpSp>
+          <p:nvGrpSpPr>
+            <p:cNvPr id="6" name="Group 5">
+              <a:extLst>
+                <a:ext uri="{FF2B5EF4-FFF2-40B4-BE49-F238E27FC236}">
+                  <a16:creationId xmlns:a16="http://schemas.microsoft.com/office/drawing/2014/main" id="{CC0BEA2E-0AAF-0586-240A-E4B1907B9A90}"/>
+                </a:ext>
+              </a:extLst>
+            </p:cNvPr>
+            <p:cNvGrpSpPr/>
+            <p:nvPr/>
+          </p:nvGrpSpPr>
+          <p:grpSpPr>
+            <a:xfrm>
+              <a:off x="1252328" y="-40111"/>
+              <a:ext cx="9295375" cy="2627200"/>
+              <a:chOff x="1262269" y="228600"/>
+              <a:chExt cx="9295375" cy="2627200"/>
+            </a:xfrm>
+          </p:grpSpPr>
+          <p:pic>
+            <p:nvPicPr>
+              <p:cNvPr id="4" name="Picture 3" descr="A graph of a graph of a graph&#10;&#10;Description automatically generated with medium confidence">
+                <a:extLst>
+                  <a:ext uri="{FF2B5EF4-FFF2-40B4-BE49-F238E27FC236}">
+                    <a16:creationId xmlns:a16="http://schemas.microsoft.com/office/drawing/2014/main" id="{DDE59B41-B1B2-5497-5639-C73CD3F067FC}"/>
+                  </a:ext>
+                </a:extLst>
+              </p:cNvPr>
+              <p:cNvPicPr>
+                <a:picLocks noChangeAspect="1"/>
+              </p:cNvPicPr>
+              <p:nvPr/>
+            </p:nvPicPr>
+            <p:blipFill rotWithShape="1">
+              <a:blip r:embed="rId2">
+                <a:extLst>
+                  <a:ext uri="{28A0092B-C50C-407E-A947-70E740481C1C}">
+                    <a14:useLocalDpi xmlns:a14="http://schemas.microsoft.com/office/drawing/2010/main" val="0"/>
+                  </a:ext>
+                </a:extLst>
+              </a:blip>
+              <a:srcRect l="11765" b="53316"/>
+              <a:stretch/>
+            </p:blipFill>
+            <p:spPr>
+              <a:xfrm>
+                <a:off x="1262269" y="472544"/>
+                <a:ext cx="6857999" cy="1732955"/>
+              </a:xfrm>
+              <a:prstGeom prst="rect">
+                <a:avLst/>
+              </a:prstGeom>
+            </p:spPr>
+          </p:pic>
+          <p:pic>
+            <p:nvPicPr>
+              <p:cNvPr id="7" name="Picture 6">
+                <a:extLst>
+                  <a:ext uri="{FF2B5EF4-FFF2-40B4-BE49-F238E27FC236}">
+                    <a16:creationId xmlns:a16="http://schemas.microsoft.com/office/drawing/2014/main" id="{1055E9EE-8265-58CE-E638-B3421C95782D}"/>
+                  </a:ext>
+                </a:extLst>
+              </p:cNvPr>
+              <p:cNvPicPr>
+                <a:picLocks noChangeAspect="1"/>
+              </p:cNvPicPr>
+              <p:nvPr/>
+            </p:nvPicPr>
+            <p:blipFill>
+              <a:blip r:embed="rId3">
+                <a:extLst>
+                  <a:ext uri="{28A0092B-C50C-407E-A947-70E740481C1C}">
+                    <a14:useLocalDpi xmlns:a14="http://schemas.microsoft.com/office/drawing/2010/main" val="0"/>
+                  </a:ext>
+                </a:extLst>
+              </a:blip>
+              <a:srcRect l="11861" r="11861"/>
+              <a:stretch/>
+            </p:blipFill>
+            <p:spPr>
+              <a:xfrm>
+                <a:off x="7672553" y="341038"/>
+                <a:ext cx="2554014" cy="2391651"/>
+              </a:xfrm>
+              <a:prstGeom prst="rect">
+                <a:avLst/>
+              </a:prstGeom>
+            </p:spPr>
+          </p:pic>
+          <p:sp>
+            <p:nvSpPr>
+              <p:cNvPr id="8" name="TextBox 7">
+                <a:extLst>
+                  <a:ext uri="{FF2B5EF4-FFF2-40B4-BE49-F238E27FC236}">
+                    <a16:creationId xmlns:a16="http://schemas.microsoft.com/office/drawing/2014/main" id="{2D54CF4F-5004-B523-395D-C1BC1BAA1238}"/>
+                  </a:ext>
+                </a:extLst>
+              </p:cNvPr>
+              <p:cNvSpPr txBox="1"/>
+              <p:nvPr/>
+            </p:nvSpPr>
+            <p:spPr>
+              <a:xfrm>
+                <a:off x="2196661" y="1807614"/>
+                <a:ext cx="5286704" cy="307777"/>
+              </a:xfrm>
+              <a:prstGeom prst="rect">
+                <a:avLst/>
+              </a:prstGeom>
+              <a:noFill/>
+            </p:spPr>
+            <p:txBody>
+              <a:bodyPr wrap="square" rtlCol="0">
+                <a:spAutoFit/>
+              </a:bodyPr>
+              <a:lstStyle/>
+              <a:p>
+                <a:pPr algn="r"/>
+                <a:r>
+                  <a:rPr lang="en-US" sz="1400" dirty="0">
+                    <a:latin typeface="Arial" panose="020B0604020202020204" pitchFamily="34" charset="0"/>
+                    <a:cs typeface="Arial" panose="020B0604020202020204" pitchFamily="34" charset="0"/>
+                  </a:rPr>
+                  <a:t>Correct</a:t>
+                </a:r>
+                <a:r>
+                  <a:rPr lang="en-US" sz="1400" dirty="0">
+                    <a:solidFill>
+                      <a:srgbClr val="0932FF"/>
+                    </a:solidFill>
+                    <a:latin typeface="Arial" panose="020B0604020202020204" pitchFamily="34" charset="0"/>
+                    <a:cs typeface="Arial" panose="020B0604020202020204" pitchFamily="34" charset="0"/>
+                  </a:rPr>
+                  <a:t>     </a:t>
+                </a:r>
+                <a:r>
+                  <a:rPr lang="en-US" sz="1400" dirty="0">
+                    <a:solidFill>
+                      <a:srgbClr val="FF0000"/>
+                    </a:solidFill>
+                    <a:latin typeface="Arial" panose="020B0604020202020204" pitchFamily="34" charset="0"/>
+                    <a:cs typeface="Arial" panose="020B0604020202020204" pitchFamily="34" charset="0"/>
+                  </a:rPr>
+                  <a:t>Error     </a:t>
+                </a:r>
+                <a:r>
+                  <a:rPr lang="en-US" sz="1400" dirty="0">
+                    <a:solidFill>
+                      <a:srgbClr val="0932FF"/>
+                    </a:solidFill>
+                    <a:latin typeface="Arial" panose="020B0604020202020204" pitchFamily="34" charset="0"/>
+                    <a:cs typeface="Arial" panose="020B0604020202020204" pitchFamily="34" charset="0"/>
+                  </a:rPr>
+                  <a:t>Difference</a:t>
+                </a:r>
+              </a:p>
+            </p:txBody>
+          </p:sp>
+          <p:sp>
+            <p:nvSpPr>
+              <p:cNvPr id="9" name="TextBox 8">
+                <a:extLst>
+                  <a:ext uri="{FF2B5EF4-FFF2-40B4-BE49-F238E27FC236}">
+                    <a16:creationId xmlns:a16="http://schemas.microsoft.com/office/drawing/2014/main" id="{2238DCA8-F98D-5985-8A2F-B0BC79C19F83}"/>
+                  </a:ext>
+                </a:extLst>
+              </p:cNvPr>
+              <p:cNvSpPr txBox="1"/>
+              <p:nvPr/>
+            </p:nvSpPr>
+            <p:spPr>
+              <a:xfrm>
+                <a:off x="8287406" y="2548023"/>
+                <a:ext cx="1035271" cy="307777"/>
+              </a:xfrm>
+              <a:prstGeom prst="rect">
+                <a:avLst/>
+              </a:prstGeom>
+              <a:solidFill>
+                <a:schemeClr val="bg1"/>
+              </a:solidFill>
+            </p:spPr>
+            <p:txBody>
+              <a:bodyPr wrap="square" rtlCol="0">
+                <a:spAutoFit/>
+              </a:bodyPr>
+              <a:lstStyle/>
+              <a:p>
+                <a:pPr algn="ctr"/>
+                <a:r>
+                  <a:rPr lang="en-US" sz="1400" dirty="0">
+                    <a:latin typeface="Arial" panose="020B0604020202020204" pitchFamily="34" charset="0"/>
+                    <a:cs typeface="Arial" panose="020B0604020202020204" pitchFamily="34" charset="0"/>
+                  </a:rPr>
+                  <a:t>   </a:t>
+                </a:r>
+              </a:p>
+            </p:txBody>
+          </p:sp>
+          <p:sp>
+            <p:nvSpPr>
+              <p:cNvPr id="10" name="TextBox 9">
+                <a:extLst>
+                  <a:ext uri="{FF2B5EF4-FFF2-40B4-BE49-F238E27FC236}">
+                    <a16:creationId xmlns:a16="http://schemas.microsoft.com/office/drawing/2014/main" id="{0DDF5332-8955-F9AE-FA63-BDA7FE827490}"/>
+                  </a:ext>
+                </a:extLst>
+              </p:cNvPr>
+              <p:cNvSpPr txBox="1"/>
+              <p:nvPr/>
+            </p:nvSpPr>
+            <p:spPr>
+              <a:xfrm>
+                <a:off x="9937529" y="2205499"/>
+                <a:ext cx="620115" cy="246221"/>
+              </a:xfrm>
+              <a:prstGeom prst="rect">
+                <a:avLst/>
+              </a:prstGeom>
+              <a:noFill/>
+            </p:spPr>
+            <p:txBody>
+              <a:bodyPr wrap="square" rtlCol="0">
+                <a:spAutoFit/>
+              </a:bodyPr>
+              <a:lstStyle/>
+              <a:p>
+                <a:pPr algn="ctr"/>
+                <a:r>
+                  <a:rPr lang="en-US" sz="1000" dirty="0">
+                    <a:latin typeface="Arial" panose="020B0604020202020204" pitchFamily="34" charset="0"/>
+                    <a:cs typeface="Arial" panose="020B0604020202020204" pitchFamily="34" charset="0"/>
+                  </a:rPr>
+                  <a:t>µV</a:t>
+                </a:r>
+              </a:p>
+            </p:txBody>
+          </p:sp>
+          <p:sp>
+            <p:nvSpPr>
+              <p:cNvPr id="2" name="TextBox 1">
+                <a:extLst>
+                  <a:ext uri="{FF2B5EF4-FFF2-40B4-BE49-F238E27FC236}">
+                    <a16:creationId xmlns:a16="http://schemas.microsoft.com/office/drawing/2014/main" id="{B63E938F-E2AC-4F05-3AB0-8DE94350DE55}"/>
+                  </a:ext>
+                </a:extLst>
+              </p:cNvPr>
+              <p:cNvSpPr txBox="1"/>
+              <p:nvPr/>
+            </p:nvSpPr>
+            <p:spPr>
+              <a:xfrm>
+                <a:off x="1450427" y="228600"/>
+                <a:ext cx="1849364" cy="369332"/>
+              </a:xfrm>
+              <a:prstGeom prst="rect">
+                <a:avLst/>
+              </a:prstGeom>
+              <a:noFill/>
+            </p:spPr>
+            <p:txBody>
+              <a:bodyPr wrap="square" rtlCol="0">
+                <a:spAutoFit/>
+              </a:bodyPr>
+              <a:lstStyle/>
+              <a:p>
+                <a:r>
+                  <a:rPr lang="en-US" dirty="0">
+                    <a:latin typeface="Arial" panose="020B0604020202020204" pitchFamily="34" charset="0"/>
+                    <a:cs typeface="Arial" panose="020B0604020202020204" pitchFamily="34" charset="0"/>
+                  </a:rPr>
+                  <a:t>Session 1</a:t>
+                </a:r>
+              </a:p>
+            </p:txBody>
+          </p:sp>
+        </p:grpSp>
+        <p:grpSp>
+          <p:nvGrpSpPr>
+            <p:cNvPr id="3" name="Group 2">
+              <a:extLst>
+                <a:ext uri="{FF2B5EF4-FFF2-40B4-BE49-F238E27FC236}">
+                  <a16:creationId xmlns:a16="http://schemas.microsoft.com/office/drawing/2014/main" id="{16C9361F-AD78-5CE8-16D5-66473DCD25A3}"/>
+                </a:ext>
+              </a:extLst>
+            </p:cNvPr>
+            <p:cNvGrpSpPr/>
+            <p:nvPr/>
+          </p:nvGrpSpPr>
+          <p:grpSpPr>
+            <a:xfrm>
+              <a:off x="1272648" y="2235436"/>
+              <a:ext cx="9275496" cy="2627200"/>
+              <a:chOff x="1282148" y="228600"/>
+              <a:chExt cx="9275496" cy="2627200"/>
+            </a:xfrm>
+          </p:grpSpPr>
+          <p:pic>
+            <p:nvPicPr>
+              <p:cNvPr id="5" name="Picture 4">
+                <a:extLst>
+                  <a:ext uri="{FF2B5EF4-FFF2-40B4-BE49-F238E27FC236}">
+                    <a16:creationId xmlns:a16="http://schemas.microsoft.com/office/drawing/2014/main" id="{5418A7EE-1117-2C35-9D68-6467D8F139A6}"/>
+                  </a:ext>
+                </a:extLst>
+              </p:cNvPr>
+              <p:cNvPicPr>
+                <a:picLocks noChangeAspect="1"/>
+              </p:cNvPicPr>
+              <p:nvPr/>
+            </p:nvPicPr>
+            <p:blipFill rotWithShape="1">
+              <a:blip r:embed="rId4">
+                <a:extLst>
+                  <a:ext uri="{28A0092B-C50C-407E-A947-70E740481C1C}">
+                    <a14:useLocalDpi xmlns:a14="http://schemas.microsoft.com/office/drawing/2010/main" val="0"/>
+                  </a:ext>
+                </a:extLst>
+              </a:blip>
+              <a:srcRect l="12020" b="53316"/>
+              <a:stretch/>
+            </p:blipFill>
+            <p:spPr>
+              <a:xfrm>
+                <a:off x="1282148" y="472544"/>
+                <a:ext cx="6838120" cy="1732955"/>
+              </a:xfrm>
+              <a:prstGeom prst="rect">
+                <a:avLst/>
+              </a:prstGeom>
+            </p:spPr>
+          </p:pic>
+          <p:pic>
+            <p:nvPicPr>
+              <p:cNvPr id="11" name="Picture 10">
+                <a:extLst>
+                  <a:ext uri="{FF2B5EF4-FFF2-40B4-BE49-F238E27FC236}">
+                    <a16:creationId xmlns:a16="http://schemas.microsoft.com/office/drawing/2014/main" id="{244AC9D2-78FD-9C13-DA1D-CEE8FB75568B}"/>
+                  </a:ext>
+                </a:extLst>
+              </p:cNvPr>
+              <p:cNvPicPr>
+                <a:picLocks noChangeAspect="1"/>
+              </p:cNvPicPr>
+              <p:nvPr/>
+            </p:nvPicPr>
+            <p:blipFill>
+              <a:blip r:embed="rId5">
+                <a:extLst>
+                  <a:ext uri="{28A0092B-C50C-407E-A947-70E740481C1C}">
+                    <a14:useLocalDpi xmlns:a14="http://schemas.microsoft.com/office/drawing/2010/main" val="0"/>
+                  </a:ext>
+                </a:extLst>
+              </a:blip>
+              <a:srcRect l="11861" r="11861"/>
+              <a:stretch/>
+            </p:blipFill>
+            <p:spPr>
+              <a:xfrm>
+                <a:off x="7672553" y="341038"/>
+                <a:ext cx="2554014" cy="2391651"/>
+              </a:xfrm>
+              <a:prstGeom prst="rect">
+                <a:avLst/>
+              </a:prstGeom>
+            </p:spPr>
+          </p:pic>
+          <p:sp>
+            <p:nvSpPr>
+              <p:cNvPr id="13" name="TextBox 12">
+                <a:extLst>
+                  <a:ext uri="{FF2B5EF4-FFF2-40B4-BE49-F238E27FC236}">
+                    <a16:creationId xmlns:a16="http://schemas.microsoft.com/office/drawing/2014/main" id="{4F542835-C77C-E819-7DD5-DA100EBD6C9A}"/>
+                  </a:ext>
+                </a:extLst>
+              </p:cNvPr>
+              <p:cNvSpPr txBox="1"/>
+              <p:nvPr/>
+            </p:nvSpPr>
+            <p:spPr>
+              <a:xfrm>
+                <a:off x="8287406" y="2548023"/>
+                <a:ext cx="1035271" cy="307777"/>
+              </a:xfrm>
+              <a:prstGeom prst="rect">
+                <a:avLst/>
+              </a:prstGeom>
+              <a:solidFill>
+                <a:schemeClr val="bg1"/>
+              </a:solidFill>
+            </p:spPr>
+            <p:txBody>
+              <a:bodyPr wrap="square" rtlCol="0">
+                <a:spAutoFit/>
+              </a:bodyPr>
+              <a:lstStyle/>
+              <a:p>
+                <a:pPr algn="ctr"/>
+                <a:r>
+                  <a:rPr lang="en-US" sz="1400" dirty="0">
+                    <a:latin typeface="Arial" panose="020B0604020202020204" pitchFamily="34" charset="0"/>
+                    <a:cs typeface="Arial" panose="020B0604020202020204" pitchFamily="34" charset="0"/>
+                  </a:rPr>
+                  <a:t>0-80ms</a:t>
+                </a:r>
+              </a:p>
+            </p:txBody>
+          </p:sp>
+          <p:sp>
+            <p:nvSpPr>
+              <p:cNvPr id="14" name="TextBox 13">
+                <a:extLst>
+                  <a:ext uri="{FF2B5EF4-FFF2-40B4-BE49-F238E27FC236}">
+                    <a16:creationId xmlns:a16="http://schemas.microsoft.com/office/drawing/2014/main" id="{ECCE28F5-F676-4F74-1060-4AF668FC45B5}"/>
+                  </a:ext>
+                </a:extLst>
+              </p:cNvPr>
+              <p:cNvSpPr txBox="1"/>
+              <p:nvPr/>
+            </p:nvSpPr>
+            <p:spPr>
+              <a:xfrm>
+                <a:off x="9937529" y="2205499"/>
+                <a:ext cx="620115" cy="246221"/>
+              </a:xfrm>
+              <a:prstGeom prst="rect">
+                <a:avLst/>
+              </a:prstGeom>
+              <a:noFill/>
+            </p:spPr>
+            <p:txBody>
+              <a:bodyPr wrap="square" rtlCol="0">
+                <a:spAutoFit/>
+              </a:bodyPr>
+              <a:lstStyle/>
+              <a:p>
+                <a:pPr algn="ctr"/>
+                <a:r>
+                  <a:rPr lang="en-US" sz="1000" dirty="0">
+                    <a:latin typeface="Arial" panose="020B0604020202020204" pitchFamily="34" charset="0"/>
+                    <a:cs typeface="Arial" panose="020B0604020202020204" pitchFamily="34" charset="0"/>
+                  </a:rPr>
+                  <a:t>µV</a:t>
+                </a:r>
+              </a:p>
+            </p:txBody>
+          </p:sp>
+          <p:sp>
+            <p:nvSpPr>
+              <p:cNvPr id="15" name="TextBox 14">
+                <a:extLst>
+                  <a:ext uri="{FF2B5EF4-FFF2-40B4-BE49-F238E27FC236}">
+                    <a16:creationId xmlns:a16="http://schemas.microsoft.com/office/drawing/2014/main" id="{55B5A371-4F52-CDBF-4BD5-EF50A21B29C0}"/>
+                  </a:ext>
+                </a:extLst>
+              </p:cNvPr>
+              <p:cNvSpPr txBox="1"/>
+              <p:nvPr/>
+            </p:nvSpPr>
+            <p:spPr>
+              <a:xfrm>
+                <a:off x="1450427" y="228600"/>
+                <a:ext cx="1849364" cy="369332"/>
+              </a:xfrm>
+              <a:prstGeom prst="rect">
+                <a:avLst/>
+              </a:prstGeom>
+              <a:noFill/>
+            </p:spPr>
+            <p:txBody>
+              <a:bodyPr wrap="square" rtlCol="0">
+                <a:spAutoFit/>
+              </a:bodyPr>
+              <a:lstStyle/>
+              <a:p>
+                <a:r>
+                  <a:rPr lang="en-US" dirty="0">
+                    <a:latin typeface="Arial" panose="020B0604020202020204" pitchFamily="34" charset="0"/>
+                    <a:cs typeface="Arial" panose="020B0604020202020204" pitchFamily="34" charset="0"/>
+                  </a:rPr>
+                  <a:t>Session 2</a:t>
+                </a:r>
+              </a:p>
+            </p:txBody>
+          </p:sp>
+        </p:grpSp>
+        <p:grpSp>
+          <p:nvGrpSpPr>
+            <p:cNvPr id="16" name="Group 15">
+              <a:extLst>
+                <a:ext uri="{FF2B5EF4-FFF2-40B4-BE49-F238E27FC236}">
+                  <a16:creationId xmlns:a16="http://schemas.microsoft.com/office/drawing/2014/main" id="{56BAC825-260D-CD3C-BC1C-93331784493F}"/>
+                </a:ext>
+              </a:extLst>
+            </p:cNvPr>
+            <p:cNvGrpSpPr/>
+            <p:nvPr/>
+          </p:nvGrpSpPr>
+          <p:grpSpPr>
+            <a:xfrm>
+              <a:off x="1272648" y="4518668"/>
+              <a:ext cx="9265558" cy="2627200"/>
+              <a:chOff x="1292086" y="228600"/>
+              <a:chExt cx="9265558" cy="2627200"/>
+            </a:xfrm>
+          </p:grpSpPr>
+          <p:pic>
+            <p:nvPicPr>
+              <p:cNvPr id="17" name="Picture 16">
+                <a:extLst>
+                  <a:ext uri="{FF2B5EF4-FFF2-40B4-BE49-F238E27FC236}">
+                    <a16:creationId xmlns:a16="http://schemas.microsoft.com/office/drawing/2014/main" id="{5B1B40D0-B44D-4BF7-C5AA-B3764BFC267F}"/>
+                  </a:ext>
+                </a:extLst>
+              </p:cNvPr>
+              <p:cNvPicPr>
+                <a:picLocks noChangeAspect="1"/>
+              </p:cNvPicPr>
+              <p:nvPr/>
+            </p:nvPicPr>
+            <p:blipFill rotWithShape="1">
+              <a:blip r:embed="rId6">
+                <a:extLst>
+                  <a:ext uri="{28A0092B-C50C-407E-A947-70E740481C1C}">
+                    <a14:useLocalDpi xmlns:a14="http://schemas.microsoft.com/office/drawing/2010/main" val="0"/>
+                  </a:ext>
+                </a:extLst>
+              </a:blip>
+              <a:srcRect l="12148" b="55744"/>
+              <a:stretch/>
+            </p:blipFill>
+            <p:spPr>
+              <a:xfrm>
+                <a:off x="1292086" y="472544"/>
+                <a:ext cx="6828181" cy="1642847"/>
+              </a:xfrm>
+              <a:prstGeom prst="rect">
+                <a:avLst/>
+              </a:prstGeom>
+            </p:spPr>
+          </p:pic>
+          <p:pic>
+            <p:nvPicPr>
+              <p:cNvPr id="18" name="Picture 17">
+                <a:extLst>
+                  <a:ext uri="{FF2B5EF4-FFF2-40B4-BE49-F238E27FC236}">
+                    <a16:creationId xmlns:a16="http://schemas.microsoft.com/office/drawing/2014/main" id="{D735EDAC-576D-7CD5-9FC7-8A1ECC9C1BE8}"/>
+                  </a:ext>
+                </a:extLst>
+              </p:cNvPr>
+              <p:cNvPicPr>
+                <a:picLocks noChangeAspect="1"/>
+              </p:cNvPicPr>
+              <p:nvPr/>
+            </p:nvPicPr>
+            <p:blipFill>
+              <a:blip r:embed="rId7">
+                <a:extLst>
+                  <a:ext uri="{28A0092B-C50C-407E-A947-70E740481C1C}">
+                    <a14:useLocalDpi xmlns:a14="http://schemas.microsoft.com/office/drawing/2010/main" val="0"/>
+                  </a:ext>
+                </a:extLst>
+              </a:blip>
+              <a:srcRect l="11861" r="11861"/>
+              <a:stretch/>
+            </p:blipFill>
+            <p:spPr>
+              <a:xfrm>
+                <a:off x="7672553" y="341038"/>
+                <a:ext cx="2554014" cy="2391651"/>
+              </a:xfrm>
+              <a:prstGeom prst="rect">
+                <a:avLst/>
+              </a:prstGeom>
+            </p:spPr>
+          </p:pic>
+          <p:sp>
+            <p:nvSpPr>
+              <p:cNvPr id="20" name="TextBox 19">
+                <a:extLst>
+                  <a:ext uri="{FF2B5EF4-FFF2-40B4-BE49-F238E27FC236}">
+                    <a16:creationId xmlns:a16="http://schemas.microsoft.com/office/drawing/2014/main" id="{646E6578-A79E-12DB-3710-C3A55EF1EF95}"/>
+                  </a:ext>
+                </a:extLst>
+              </p:cNvPr>
+              <p:cNvSpPr txBox="1"/>
+              <p:nvPr/>
+            </p:nvSpPr>
+            <p:spPr>
+              <a:xfrm>
+                <a:off x="8287406" y="2548023"/>
+                <a:ext cx="1035271" cy="307777"/>
+              </a:xfrm>
+              <a:prstGeom prst="rect">
+                <a:avLst/>
+              </a:prstGeom>
+              <a:solidFill>
+                <a:schemeClr val="bg1"/>
+              </a:solidFill>
+            </p:spPr>
+            <p:txBody>
+              <a:bodyPr wrap="square" rtlCol="0">
+                <a:spAutoFit/>
+              </a:bodyPr>
+              <a:lstStyle/>
+              <a:p>
+                <a:pPr algn="ctr"/>
+                <a:r>
+                  <a:rPr lang="en-US" sz="1400" dirty="0">
+                    <a:latin typeface="Arial" panose="020B0604020202020204" pitchFamily="34" charset="0"/>
+                    <a:cs typeface="Arial" panose="020B0604020202020204" pitchFamily="34" charset="0"/>
+                  </a:rPr>
+                  <a:t>0-80ms</a:t>
+                </a:r>
+              </a:p>
+            </p:txBody>
+          </p:sp>
+          <p:sp>
+            <p:nvSpPr>
+              <p:cNvPr id="21" name="TextBox 20">
+                <a:extLst>
+                  <a:ext uri="{FF2B5EF4-FFF2-40B4-BE49-F238E27FC236}">
+                    <a16:creationId xmlns:a16="http://schemas.microsoft.com/office/drawing/2014/main" id="{42636449-1883-9DB3-9A53-10870D55051A}"/>
+                  </a:ext>
+                </a:extLst>
+              </p:cNvPr>
+              <p:cNvSpPr txBox="1"/>
+              <p:nvPr/>
+            </p:nvSpPr>
+            <p:spPr>
+              <a:xfrm>
+                <a:off x="9937529" y="2205499"/>
+                <a:ext cx="620115" cy="246221"/>
+              </a:xfrm>
+              <a:prstGeom prst="rect">
+                <a:avLst/>
+              </a:prstGeom>
+              <a:noFill/>
+            </p:spPr>
+            <p:txBody>
+              <a:bodyPr wrap="square" rtlCol="0">
+                <a:spAutoFit/>
+              </a:bodyPr>
+              <a:lstStyle/>
+              <a:p>
+                <a:pPr algn="ctr"/>
+                <a:r>
+                  <a:rPr lang="en-US" sz="1000" dirty="0">
+                    <a:latin typeface="Arial" panose="020B0604020202020204" pitchFamily="34" charset="0"/>
+                    <a:cs typeface="Arial" panose="020B0604020202020204" pitchFamily="34" charset="0"/>
+                  </a:rPr>
+                  <a:t>µV</a:t>
+                </a:r>
+              </a:p>
+            </p:txBody>
+          </p:sp>
+          <p:sp>
+            <p:nvSpPr>
+              <p:cNvPr id="22" name="TextBox 21">
+                <a:extLst>
+                  <a:ext uri="{FF2B5EF4-FFF2-40B4-BE49-F238E27FC236}">
+                    <a16:creationId xmlns:a16="http://schemas.microsoft.com/office/drawing/2014/main" id="{B3DE745A-01BF-8536-42B6-57945EA5D6EC}"/>
+                  </a:ext>
+                </a:extLst>
+              </p:cNvPr>
+              <p:cNvSpPr txBox="1"/>
+              <p:nvPr/>
+            </p:nvSpPr>
+            <p:spPr>
+              <a:xfrm>
+                <a:off x="1450427" y="228600"/>
+                <a:ext cx="1849364" cy="369332"/>
+              </a:xfrm>
+              <a:prstGeom prst="rect">
+                <a:avLst/>
+              </a:prstGeom>
+              <a:noFill/>
+            </p:spPr>
+            <p:txBody>
+              <a:bodyPr wrap="square" rtlCol="0">
+                <a:spAutoFit/>
+              </a:bodyPr>
+              <a:lstStyle/>
+              <a:p>
+                <a:r>
+                  <a:rPr lang="en-US" dirty="0">
+                    <a:latin typeface="Arial" panose="020B0604020202020204" pitchFamily="34" charset="0"/>
+                    <a:cs typeface="Arial" panose="020B0604020202020204" pitchFamily="34" charset="0"/>
+                  </a:rPr>
+                  <a:t>Session 3</a:t>
+                </a:r>
+              </a:p>
+            </p:txBody>
+          </p:sp>
+        </p:grpSp>
+      </p:grpSp>
+    </p:spTree>
+    <p:extLst>
+      <p:ext uri="{BB962C8B-B14F-4D97-AF65-F5344CB8AC3E}">
+        <p14:creationId xmlns:p14="http://schemas.microsoft.com/office/powerpoint/2010/main" val="987159418"/>
+      </p:ext>
+    </p:extLst>
+  </p:cSld>
+  <p:clrMapOvr>
+    <a:masterClrMapping/>
+  </p:clrMapOvr>
+</p:sld>
+</file>
+
+<file path=ppt/slides/slide4.xml><?xml version="1.0" encoding="utf-8"?>
+<p:sld xmlns:a="http://schemas.openxmlformats.org/drawingml/2006/main" xmlns:r="http://schemas.openxmlformats.org/officeDocument/2006/relationships" xmlns:p="http://schemas.openxmlformats.org/presentationml/2006/main">
+  <p:cSld>
+    <p:spTree>
+      <p:nvGrpSpPr>
+        <p:cNvPr id="1" name=""/>
+        <p:cNvGrpSpPr/>
+        <p:nvPr/>
+      </p:nvGrpSpPr>
+      <p:grpSpPr>
+        <a:xfrm>
+          <a:off x="0" y="0"/>
+          <a:ext cx="0" cy="0"/>
+          <a:chOff x="0" y="0"/>
+          <a:chExt cx="0" cy="0"/>
+        </a:xfrm>
+      </p:grpSpPr>
+      <p:grpSp>
+        <p:nvGrpSpPr>
+          <p:cNvPr id="5" name="Group 4">
+            <a:extLst>
+              <a:ext uri="{FF2B5EF4-FFF2-40B4-BE49-F238E27FC236}">
+                <a16:creationId xmlns:a16="http://schemas.microsoft.com/office/drawing/2014/main" id="{550C8DA5-5CB8-F48A-DC35-94F2B6237D9E}"/>
+              </a:ext>
+            </a:extLst>
+          </p:cNvPr>
+          <p:cNvGrpSpPr/>
+          <p:nvPr/>
+        </p:nvGrpSpPr>
+        <p:grpSpPr>
+          <a:xfrm>
+            <a:off x="1282148" y="228600"/>
+            <a:ext cx="9275496" cy="2627200"/>
+            <a:chOff x="1282148" y="228600"/>
+            <a:chExt cx="9275496" cy="2627200"/>
+          </a:xfrm>
+        </p:grpSpPr>
+        <p:pic>
+          <p:nvPicPr>
+            <p:cNvPr id="4" name="Picture 3">
+              <a:extLst>
+                <a:ext uri="{FF2B5EF4-FFF2-40B4-BE49-F238E27FC236}">
+                  <a16:creationId xmlns:a16="http://schemas.microsoft.com/office/drawing/2014/main" id="{DDE59B41-B1B2-5497-5639-C73CD3F067FC}"/>
+                </a:ext>
+              </a:extLst>
+            </p:cNvPr>
+            <p:cNvPicPr>
+              <a:picLocks noChangeAspect="1"/>
+            </p:cNvPicPr>
+            <p:nvPr/>
+          </p:nvPicPr>
+          <p:blipFill rotWithShape="1">
+            <a:blip r:embed="rId2">
+              <a:extLst>
+                <a:ext uri="{28A0092B-C50C-407E-A947-70E740481C1C}">
+                  <a14:useLocalDpi xmlns:a14="http://schemas.microsoft.com/office/drawing/2010/main" val="0"/>
+                </a:ext>
+              </a:extLst>
+            </a:blip>
+            <a:srcRect l="12020" b="53316"/>
+            <a:stretch/>
+          </p:blipFill>
+          <p:spPr>
+            <a:xfrm>
+              <a:off x="1282148" y="472544"/>
+              <a:ext cx="6838120" cy="1732955"/>
+            </a:xfrm>
+            <a:prstGeom prst="rect">
+              <a:avLst/>
+            </a:prstGeom>
+          </p:spPr>
+        </p:pic>
+        <p:pic>
+          <p:nvPicPr>
+            <p:cNvPr id="7" name="Picture 6">
+              <a:extLst>
+                <a:ext uri="{FF2B5EF4-FFF2-40B4-BE49-F238E27FC236}">
+                  <a16:creationId xmlns:a16="http://schemas.microsoft.com/office/drawing/2014/main" id="{1055E9EE-8265-58CE-E638-B3421C95782D}"/>
+                </a:ext>
+              </a:extLst>
+            </p:cNvPr>
+            <p:cNvPicPr>
+              <a:picLocks noChangeAspect="1"/>
+            </p:cNvPicPr>
+            <p:nvPr/>
+          </p:nvPicPr>
+          <p:blipFill>
+            <a:blip r:embed="rId3">
+              <a:extLst>
+                <a:ext uri="{28A0092B-C50C-407E-A947-70E740481C1C}">
+                  <a14:useLocalDpi xmlns:a14="http://schemas.microsoft.com/office/drawing/2010/main" val="0"/>
+                </a:ext>
+              </a:extLst>
+            </a:blip>
+            <a:srcRect l="11861" r="11861"/>
+            <a:stretch/>
+          </p:blipFill>
+          <p:spPr>
+            <a:xfrm>
+              <a:off x="7672553" y="341038"/>
+              <a:ext cx="2554014" cy="2391651"/>
+            </a:xfrm>
+            <a:prstGeom prst="rect">
+              <a:avLst/>
+            </a:prstGeom>
+          </p:spPr>
+        </p:pic>
+        <p:sp>
+          <p:nvSpPr>
+            <p:cNvPr id="8" name="TextBox 7">
+              <a:extLst>
+                <a:ext uri="{FF2B5EF4-FFF2-40B4-BE49-F238E27FC236}">
+                  <a16:creationId xmlns:a16="http://schemas.microsoft.com/office/drawing/2014/main" id="{2D54CF4F-5004-B523-395D-C1BC1BAA1238}"/>
+                </a:ext>
+              </a:extLst>
+            </p:cNvPr>
+            <p:cNvSpPr txBox="1"/>
+            <p:nvPr/>
+          </p:nvSpPr>
+          <p:spPr>
+            <a:xfrm>
+              <a:off x="2196661" y="1807614"/>
+              <a:ext cx="5286704" cy="307777"/>
+            </a:xfrm>
+            <a:prstGeom prst="rect">
+              <a:avLst/>
+            </a:prstGeom>
+            <a:noFill/>
+          </p:spPr>
+          <p:txBody>
+            <a:bodyPr wrap="square" rtlCol="0">
+              <a:spAutoFit/>
+            </a:bodyPr>
+            <a:lstStyle/>
+            <a:p>
+              <a:pPr algn="r"/>
+              <a:r>
+                <a:rPr lang="en-US" sz="1400" dirty="0">
+                  <a:latin typeface="Arial" panose="020B0604020202020204" pitchFamily="34" charset="0"/>
+                  <a:cs typeface="Arial" panose="020B0604020202020204" pitchFamily="34" charset="0"/>
+                </a:rPr>
+                <a:t>Correct</a:t>
+              </a:r>
+              <a:r>
+                <a:rPr lang="en-US" sz="1400" dirty="0">
+                  <a:solidFill>
+                    <a:srgbClr val="0932FF"/>
+                  </a:solidFill>
+                  <a:latin typeface="Arial" panose="020B0604020202020204" pitchFamily="34" charset="0"/>
+                  <a:cs typeface="Arial" panose="020B0604020202020204" pitchFamily="34" charset="0"/>
+                </a:rPr>
+                <a:t>     </a:t>
+              </a:r>
+              <a:r>
+                <a:rPr lang="en-US" sz="1400" dirty="0">
+                  <a:solidFill>
+                    <a:srgbClr val="FF0000"/>
+                  </a:solidFill>
+                  <a:latin typeface="Arial" panose="020B0604020202020204" pitchFamily="34" charset="0"/>
+                  <a:cs typeface="Arial" panose="020B0604020202020204" pitchFamily="34" charset="0"/>
+                </a:rPr>
+                <a:t>Error     </a:t>
+              </a:r>
+              <a:r>
+                <a:rPr lang="en-US" sz="1400" dirty="0">
+                  <a:solidFill>
+                    <a:srgbClr val="0932FF"/>
+                  </a:solidFill>
+                  <a:latin typeface="Arial" panose="020B0604020202020204" pitchFamily="34" charset="0"/>
+                  <a:cs typeface="Arial" panose="020B0604020202020204" pitchFamily="34" charset="0"/>
+                </a:rPr>
+                <a:t>Difference</a:t>
+              </a:r>
+            </a:p>
+          </p:txBody>
+        </p:sp>
+        <p:sp>
+          <p:nvSpPr>
+            <p:cNvPr id="9" name="TextBox 8">
+              <a:extLst>
+                <a:ext uri="{FF2B5EF4-FFF2-40B4-BE49-F238E27FC236}">
+                  <a16:creationId xmlns:a16="http://schemas.microsoft.com/office/drawing/2014/main" id="{2238DCA8-F98D-5985-8A2F-B0BC79C19F83}"/>
+                </a:ext>
+              </a:extLst>
+            </p:cNvPr>
+            <p:cNvSpPr txBox="1"/>
+            <p:nvPr/>
+          </p:nvSpPr>
+          <p:spPr>
+            <a:xfrm>
+              <a:off x="8287406" y="2548023"/>
+              <a:ext cx="1035271" cy="307777"/>
+            </a:xfrm>
+            <a:prstGeom prst="rect">
+              <a:avLst/>
+            </a:prstGeom>
+            <a:solidFill>
+              <a:schemeClr val="bg1"/>
+            </a:solidFill>
+          </p:spPr>
+          <p:txBody>
+            <a:bodyPr wrap="square" rtlCol="0">
+              <a:spAutoFit/>
+            </a:bodyPr>
+            <a:lstStyle/>
+            <a:p>
+              <a:pPr algn="ctr"/>
+              <a:r>
+                <a:rPr lang="en-US" sz="1400" dirty="0">
+                  <a:latin typeface="Arial" panose="020B0604020202020204" pitchFamily="34" charset="0"/>
+                  <a:cs typeface="Arial" panose="020B0604020202020204" pitchFamily="34" charset="0"/>
+                </a:rPr>
+                <a:t>0-80ms</a:t>
+              </a:r>
+            </a:p>
+          </p:txBody>
+        </p:sp>
+        <p:sp>
+          <p:nvSpPr>
+            <p:cNvPr id="10" name="TextBox 9">
+              <a:extLst>
+                <a:ext uri="{FF2B5EF4-FFF2-40B4-BE49-F238E27FC236}">
+                  <a16:creationId xmlns:a16="http://schemas.microsoft.com/office/drawing/2014/main" id="{0DDF5332-8955-F9AE-FA63-BDA7FE827490}"/>
+                </a:ext>
+              </a:extLst>
+            </p:cNvPr>
+            <p:cNvSpPr txBox="1"/>
+            <p:nvPr/>
+          </p:nvSpPr>
+          <p:spPr>
+            <a:xfrm>
+              <a:off x="9937529" y="2205499"/>
+              <a:ext cx="620115" cy="246221"/>
+            </a:xfrm>
+            <a:prstGeom prst="rect">
+              <a:avLst/>
+            </a:prstGeom>
+            <a:noFill/>
+          </p:spPr>
+          <p:txBody>
+            <a:bodyPr wrap="square" rtlCol="0">
+              <a:spAutoFit/>
+            </a:bodyPr>
+            <a:lstStyle/>
+            <a:p>
+              <a:pPr algn="ctr"/>
+              <a:r>
+                <a:rPr lang="en-US" sz="1000" dirty="0">
+                  <a:latin typeface="Arial" panose="020B0604020202020204" pitchFamily="34" charset="0"/>
+                  <a:cs typeface="Arial" panose="020B0604020202020204" pitchFamily="34" charset="0"/>
+                </a:rPr>
+                <a:t>µV</a:t>
+              </a:r>
+            </a:p>
+          </p:txBody>
+        </p:sp>
+        <p:sp>
+          <p:nvSpPr>
+            <p:cNvPr id="2" name="TextBox 1">
+              <a:extLst>
+                <a:ext uri="{FF2B5EF4-FFF2-40B4-BE49-F238E27FC236}">
+                  <a16:creationId xmlns:a16="http://schemas.microsoft.com/office/drawing/2014/main" id="{B63E938F-E2AC-4F05-3AB0-8DE94350DE55}"/>
+                </a:ext>
+              </a:extLst>
+            </p:cNvPr>
+            <p:cNvSpPr txBox="1"/>
+            <p:nvPr/>
+          </p:nvSpPr>
+          <p:spPr>
+            <a:xfrm>
+              <a:off x="1450427" y="228600"/>
+              <a:ext cx="1849364" cy="369332"/>
+            </a:xfrm>
+            <a:prstGeom prst="rect">
+              <a:avLst/>
+            </a:prstGeom>
+            <a:noFill/>
+          </p:spPr>
+          <p:txBody>
+            <a:bodyPr wrap="square" rtlCol="0">
+              <a:spAutoFit/>
+            </a:bodyPr>
+            <a:lstStyle/>
+            <a:p>
+              <a:r>
+                <a:rPr lang="en-US" dirty="0">
+                  <a:latin typeface="Arial" panose="020B0604020202020204" pitchFamily="34" charset="0"/>
+                  <a:cs typeface="Arial" panose="020B0604020202020204" pitchFamily="34" charset="0"/>
+                </a:rPr>
+                <a:t>Session 2</a:t>
+              </a:r>
+            </a:p>
+          </p:txBody>
+        </p:sp>
+      </p:grpSp>
+    </p:spTree>
+    <p:extLst>
+      <p:ext uri="{BB962C8B-B14F-4D97-AF65-F5344CB8AC3E}">
+        <p14:creationId xmlns:p14="http://schemas.microsoft.com/office/powerpoint/2010/main" val="3366674529"/>
+      </p:ext>
+    </p:extLst>
+  </p:cSld>
+  <p:clrMapOvr>
+    <a:masterClrMapping/>
+  </p:clrMapOvr>
+</p:sld>
+</file>
+
+<file path=ppt/slides/slide5.xml><?xml version="1.0" encoding="utf-8"?>
+<p:sld xmlns:a="http://schemas.openxmlformats.org/drawingml/2006/main" xmlns:r="http://schemas.openxmlformats.org/officeDocument/2006/relationships" xmlns:p="http://schemas.openxmlformats.org/presentationml/2006/main">
+  <p:cSld>
+    <p:spTree>
+      <p:nvGrpSpPr>
+        <p:cNvPr id="1" name=""/>
+        <p:cNvGrpSpPr/>
+        <p:nvPr/>
+      </p:nvGrpSpPr>
+      <p:grpSpPr>
+        <a:xfrm>
+          <a:off x="0" y="0"/>
+          <a:ext cx="0" cy="0"/>
+          <a:chOff x="0" y="0"/>
+          <a:chExt cx="0" cy="0"/>
+        </a:xfrm>
+      </p:grpSpPr>
+      <p:grpSp>
+        <p:nvGrpSpPr>
+          <p:cNvPr id="5" name="Group 4">
+            <a:extLst>
+              <a:ext uri="{FF2B5EF4-FFF2-40B4-BE49-F238E27FC236}">
+                <a16:creationId xmlns:a16="http://schemas.microsoft.com/office/drawing/2014/main" id="{27634083-9A15-7939-6D72-D882D1B2944A}"/>
+              </a:ext>
+            </a:extLst>
+          </p:cNvPr>
+          <p:cNvGrpSpPr/>
+          <p:nvPr/>
+        </p:nvGrpSpPr>
+        <p:grpSpPr>
+          <a:xfrm>
+            <a:off x="1292086" y="472440"/>
+            <a:ext cx="9265558" cy="2627200"/>
+            <a:chOff x="1292086" y="228600"/>
+            <a:chExt cx="9265558" cy="2627200"/>
+          </a:xfrm>
+        </p:grpSpPr>
+        <p:pic>
+          <p:nvPicPr>
+            <p:cNvPr id="4" name="Picture 3">
+              <a:extLst>
+                <a:ext uri="{FF2B5EF4-FFF2-40B4-BE49-F238E27FC236}">
+                  <a16:creationId xmlns:a16="http://schemas.microsoft.com/office/drawing/2014/main" id="{DDE59B41-B1B2-5497-5639-C73CD3F067FC}"/>
+                </a:ext>
+              </a:extLst>
+            </p:cNvPr>
+            <p:cNvPicPr>
+              <a:picLocks noChangeAspect="1"/>
+            </p:cNvPicPr>
+            <p:nvPr/>
+          </p:nvPicPr>
+          <p:blipFill rotWithShape="1">
+            <a:blip r:embed="rId2">
+              <a:extLst>
+                <a:ext uri="{28A0092B-C50C-407E-A947-70E740481C1C}">
+                  <a14:useLocalDpi xmlns:a14="http://schemas.microsoft.com/office/drawing/2010/main" val="0"/>
+                </a:ext>
+              </a:extLst>
+            </a:blip>
+            <a:srcRect l="12148" b="55744"/>
+            <a:stretch/>
+          </p:blipFill>
+          <p:spPr>
+            <a:xfrm>
+              <a:off x="1292086" y="472544"/>
+              <a:ext cx="6828181" cy="1642847"/>
+            </a:xfrm>
+            <a:prstGeom prst="rect">
+              <a:avLst/>
+            </a:prstGeom>
+          </p:spPr>
+        </p:pic>
+        <p:pic>
+          <p:nvPicPr>
+            <p:cNvPr id="7" name="Picture 6">
+              <a:extLst>
+                <a:ext uri="{FF2B5EF4-FFF2-40B4-BE49-F238E27FC236}">
+                  <a16:creationId xmlns:a16="http://schemas.microsoft.com/office/drawing/2014/main" id="{1055E9EE-8265-58CE-E638-B3421C95782D}"/>
+                </a:ext>
+              </a:extLst>
+            </p:cNvPr>
+            <p:cNvPicPr>
+              <a:picLocks noChangeAspect="1"/>
+            </p:cNvPicPr>
+            <p:nvPr/>
+          </p:nvPicPr>
+          <p:blipFill>
+            <a:blip r:embed="rId3">
+              <a:extLst>
+                <a:ext uri="{28A0092B-C50C-407E-A947-70E740481C1C}">
+                  <a14:useLocalDpi xmlns:a14="http://schemas.microsoft.com/office/drawing/2010/main" val="0"/>
+                </a:ext>
+              </a:extLst>
+            </a:blip>
+            <a:srcRect l="11861" r="11861"/>
+            <a:stretch/>
+          </p:blipFill>
+          <p:spPr>
+            <a:xfrm>
+              <a:off x="7672553" y="341038"/>
+              <a:ext cx="2554014" cy="2391651"/>
+            </a:xfrm>
+            <a:prstGeom prst="rect">
+              <a:avLst/>
+            </a:prstGeom>
+          </p:spPr>
+        </p:pic>
+        <p:sp>
+          <p:nvSpPr>
+            <p:cNvPr id="8" name="TextBox 7">
+              <a:extLst>
+                <a:ext uri="{FF2B5EF4-FFF2-40B4-BE49-F238E27FC236}">
+                  <a16:creationId xmlns:a16="http://schemas.microsoft.com/office/drawing/2014/main" id="{2D54CF4F-5004-B523-395D-C1BC1BAA1238}"/>
+                </a:ext>
+              </a:extLst>
+            </p:cNvPr>
+            <p:cNvSpPr txBox="1"/>
+            <p:nvPr/>
+          </p:nvSpPr>
+          <p:spPr>
+            <a:xfrm>
+              <a:off x="2196661" y="1807614"/>
+              <a:ext cx="5286704" cy="307777"/>
+            </a:xfrm>
+            <a:prstGeom prst="rect">
+              <a:avLst/>
+            </a:prstGeom>
+            <a:noFill/>
+          </p:spPr>
+          <p:txBody>
+            <a:bodyPr wrap="square" rtlCol="0">
+              <a:spAutoFit/>
+            </a:bodyPr>
+            <a:lstStyle/>
+            <a:p>
+              <a:pPr algn="r"/>
+              <a:r>
+                <a:rPr lang="en-US" sz="1400" dirty="0">
+                  <a:latin typeface="Arial" panose="020B0604020202020204" pitchFamily="34" charset="0"/>
+                  <a:cs typeface="Arial" panose="020B0604020202020204" pitchFamily="34" charset="0"/>
+                </a:rPr>
+                <a:t>Correct</a:t>
+              </a:r>
+              <a:r>
+                <a:rPr lang="en-US" sz="1400" dirty="0">
+                  <a:solidFill>
+                    <a:srgbClr val="0932FF"/>
+                  </a:solidFill>
+                  <a:latin typeface="Arial" panose="020B0604020202020204" pitchFamily="34" charset="0"/>
+                  <a:cs typeface="Arial" panose="020B0604020202020204" pitchFamily="34" charset="0"/>
+                </a:rPr>
+                <a:t>     </a:t>
+              </a:r>
+              <a:r>
+                <a:rPr lang="en-US" sz="1400" dirty="0">
+                  <a:solidFill>
+                    <a:srgbClr val="FF0000"/>
+                  </a:solidFill>
+                  <a:latin typeface="Arial" panose="020B0604020202020204" pitchFamily="34" charset="0"/>
+                  <a:cs typeface="Arial" panose="020B0604020202020204" pitchFamily="34" charset="0"/>
+                </a:rPr>
+                <a:t>Error     </a:t>
+              </a:r>
+              <a:r>
+                <a:rPr lang="en-US" sz="1400" dirty="0">
+                  <a:solidFill>
+                    <a:srgbClr val="0932FF"/>
+                  </a:solidFill>
+                  <a:latin typeface="Arial" panose="020B0604020202020204" pitchFamily="34" charset="0"/>
+                  <a:cs typeface="Arial" panose="020B0604020202020204" pitchFamily="34" charset="0"/>
+                </a:rPr>
+                <a:t>Difference</a:t>
+              </a:r>
+            </a:p>
+          </p:txBody>
+        </p:sp>
+        <p:sp>
+          <p:nvSpPr>
+            <p:cNvPr id="9" name="TextBox 8">
+              <a:extLst>
+                <a:ext uri="{FF2B5EF4-FFF2-40B4-BE49-F238E27FC236}">
+                  <a16:creationId xmlns:a16="http://schemas.microsoft.com/office/drawing/2014/main" id="{2238DCA8-F98D-5985-8A2F-B0BC79C19F83}"/>
+                </a:ext>
+              </a:extLst>
+            </p:cNvPr>
+            <p:cNvSpPr txBox="1"/>
+            <p:nvPr/>
+          </p:nvSpPr>
+          <p:spPr>
+            <a:xfrm>
+              <a:off x="8287406" y="2548023"/>
+              <a:ext cx="1035271" cy="307777"/>
+            </a:xfrm>
+            <a:prstGeom prst="rect">
+              <a:avLst/>
+            </a:prstGeom>
+            <a:solidFill>
+              <a:schemeClr val="bg1"/>
+            </a:solidFill>
+          </p:spPr>
+          <p:txBody>
+            <a:bodyPr wrap="square" rtlCol="0">
+              <a:spAutoFit/>
+            </a:bodyPr>
+            <a:lstStyle/>
+            <a:p>
+              <a:pPr algn="ctr"/>
+              <a:r>
+                <a:rPr lang="en-US" sz="1400" dirty="0">
+                  <a:latin typeface="Arial" panose="020B0604020202020204" pitchFamily="34" charset="0"/>
+                  <a:cs typeface="Arial" panose="020B0604020202020204" pitchFamily="34" charset="0"/>
+                </a:rPr>
+                <a:t>0-80ms</a:t>
+              </a:r>
+            </a:p>
+          </p:txBody>
+        </p:sp>
+        <p:sp>
+          <p:nvSpPr>
+            <p:cNvPr id="10" name="TextBox 9">
+              <a:extLst>
+                <a:ext uri="{FF2B5EF4-FFF2-40B4-BE49-F238E27FC236}">
+                  <a16:creationId xmlns:a16="http://schemas.microsoft.com/office/drawing/2014/main" id="{0DDF5332-8955-F9AE-FA63-BDA7FE827490}"/>
+                </a:ext>
+              </a:extLst>
+            </p:cNvPr>
+            <p:cNvSpPr txBox="1"/>
+            <p:nvPr/>
+          </p:nvSpPr>
+          <p:spPr>
+            <a:xfrm>
+              <a:off x="9937529" y="2205499"/>
+              <a:ext cx="620115" cy="246221"/>
+            </a:xfrm>
+            <a:prstGeom prst="rect">
+              <a:avLst/>
+            </a:prstGeom>
+            <a:noFill/>
+          </p:spPr>
+          <p:txBody>
+            <a:bodyPr wrap="square" rtlCol="0">
+              <a:spAutoFit/>
+            </a:bodyPr>
+            <a:lstStyle/>
+            <a:p>
+              <a:pPr algn="ctr"/>
+              <a:r>
+                <a:rPr lang="en-US" sz="1000" dirty="0">
+                  <a:latin typeface="Arial" panose="020B0604020202020204" pitchFamily="34" charset="0"/>
+                  <a:cs typeface="Arial" panose="020B0604020202020204" pitchFamily="34" charset="0"/>
+                </a:rPr>
+                <a:t>µV</a:t>
+              </a:r>
+            </a:p>
+          </p:txBody>
+        </p:sp>
+        <p:sp>
+          <p:nvSpPr>
+            <p:cNvPr id="2" name="TextBox 1">
+              <a:extLst>
+                <a:ext uri="{FF2B5EF4-FFF2-40B4-BE49-F238E27FC236}">
+                  <a16:creationId xmlns:a16="http://schemas.microsoft.com/office/drawing/2014/main" id="{B63E938F-E2AC-4F05-3AB0-8DE94350DE55}"/>
+                </a:ext>
+              </a:extLst>
+            </p:cNvPr>
+            <p:cNvSpPr txBox="1"/>
+            <p:nvPr/>
+          </p:nvSpPr>
+          <p:spPr>
+            <a:xfrm>
+              <a:off x="1450427" y="228600"/>
+              <a:ext cx="1849364" cy="369332"/>
+            </a:xfrm>
+            <a:prstGeom prst="rect">
+              <a:avLst/>
+            </a:prstGeom>
+            <a:noFill/>
+          </p:spPr>
+          <p:txBody>
+            <a:bodyPr wrap="square" rtlCol="0">
+              <a:spAutoFit/>
+            </a:bodyPr>
+            <a:lstStyle/>
+            <a:p>
+              <a:r>
+                <a:rPr lang="en-US" dirty="0">
+                  <a:latin typeface="Arial" panose="020B0604020202020204" pitchFamily="34" charset="0"/>
+                  <a:cs typeface="Arial" panose="020B0604020202020204" pitchFamily="34" charset="0"/>
+                </a:rPr>
+                <a:t>Session 3</a:t>
+              </a:r>
+            </a:p>
+          </p:txBody>
+        </p:sp>
+      </p:grpSp>
+    </p:spTree>
+    <p:extLst>
+      <p:ext uri="{BB962C8B-B14F-4D97-AF65-F5344CB8AC3E}">
+        <p14:creationId xmlns:p14="http://schemas.microsoft.com/office/powerpoint/2010/main" val="1696716883"/>
+      </p:ext>
+    </p:extLst>
+  </p:cSld>
+  <p:clrMapOvr>
+    <a:masterClrMapping/>
+  </p:clrMapOvr>
+</p:sld>
+</file>
+
 <file path=ppt/theme/theme1.xml><?xml version="1.0" encoding="utf-8"?>
 <a:theme xmlns:a="http://schemas.openxmlformats.org/drawingml/2006/main" name="Office Theme">
   <a:themeElements>

</xml_diff>